<commit_message>
2018. 02. 17. Updatae README.md & ProjectInfo
</commit_message>
<xml_diff>
--- a/ProjectInfo/PPT-Not-Original.pptx
+++ b/ProjectInfo/PPT-Not-Original.pptx
@@ -27,6 +27,7 @@
     <p:sldId id="275" r:id="rId21"/>
     <p:sldId id="276" r:id="rId22"/>
     <p:sldId id="277" r:id="rId23"/>
+    <p:sldId id="278" r:id="rId24"/>
   </p:sldIdLst>
   <p:sldSz cx="12192000" cy="6858000"/>
   <p:notesSz cx="6858000" cy="9144000"/>
@@ -280,7 +281,7 @@
           <a:p>
             <a:fld id="{D128741C-C433-404C-A096-8144BE32B6BD}" type="datetimeFigureOut">
               <a:rPr lang="ko-KR" altLang="en-US" smtClean="0"/>
-              <a:t>2018-02-16</a:t>
+              <a:t>2018-02-17</a:t>
             </a:fld>
             <a:endParaRPr lang="ko-KR" altLang="en-US"/>
           </a:p>
@@ -478,7 +479,7 @@
           <a:p>
             <a:fld id="{D128741C-C433-404C-A096-8144BE32B6BD}" type="datetimeFigureOut">
               <a:rPr lang="ko-KR" altLang="en-US" smtClean="0"/>
-              <a:t>2018-02-16</a:t>
+              <a:t>2018-02-17</a:t>
             </a:fld>
             <a:endParaRPr lang="ko-KR" altLang="en-US"/>
           </a:p>
@@ -686,7 +687,7 @@
           <a:p>
             <a:fld id="{D128741C-C433-404C-A096-8144BE32B6BD}" type="datetimeFigureOut">
               <a:rPr lang="ko-KR" altLang="en-US" smtClean="0"/>
-              <a:t>2018-02-16</a:t>
+              <a:t>2018-02-17</a:t>
             </a:fld>
             <a:endParaRPr lang="ko-KR" altLang="en-US"/>
           </a:p>
@@ -884,7 +885,7 @@
           <a:p>
             <a:fld id="{D128741C-C433-404C-A096-8144BE32B6BD}" type="datetimeFigureOut">
               <a:rPr lang="ko-KR" altLang="en-US" smtClean="0"/>
-              <a:t>2018-02-16</a:t>
+              <a:t>2018-02-17</a:t>
             </a:fld>
             <a:endParaRPr lang="ko-KR" altLang="en-US"/>
           </a:p>
@@ -1159,7 +1160,7 @@
           <a:p>
             <a:fld id="{D128741C-C433-404C-A096-8144BE32B6BD}" type="datetimeFigureOut">
               <a:rPr lang="ko-KR" altLang="en-US" smtClean="0"/>
-              <a:t>2018-02-16</a:t>
+              <a:t>2018-02-17</a:t>
             </a:fld>
             <a:endParaRPr lang="ko-KR" altLang="en-US"/>
           </a:p>
@@ -1424,7 +1425,7 @@
           <a:p>
             <a:fld id="{D128741C-C433-404C-A096-8144BE32B6BD}" type="datetimeFigureOut">
               <a:rPr lang="ko-KR" altLang="en-US" smtClean="0"/>
-              <a:t>2018-02-16</a:t>
+              <a:t>2018-02-17</a:t>
             </a:fld>
             <a:endParaRPr lang="ko-KR" altLang="en-US"/>
           </a:p>
@@ -1836,7 +1837,7 @@
           <a:p>
             <a:fld id="{D128741C-C433-404C-A096-8144BE32B6BD}" type="datetimeFigureOut">
               <a:rPr lang="ko-KR" altLang="en-US" smtClean="0"/>
-              <a:t>2018-02-16</a:t>
+              <a:t>2018-02-17</a:t>
             </a:fld>
             <a:endParaRPr lang="ko-KR" altLang="en-US"/>
           </a:p>
@@ -1977,7 +1978,7 @@
           <a:p>
             <a:fld id="{D128741C-C433-404C-A096-8144BE32B6BD}" type="datetimeFigureOut">
               <a:rPr lang="ko-KR" altLang="en-US" smtClean="0"/>
-              <a:t>2018-02-16</a:t>
+              <a:t>2018-02-17</a:t>
             </a:fld>
             <a:endParaRPr lang="ko-KR" altLang="en-US"/>
           </a:p>
@@ -2090,7 +2091,7 @@
           <a:p>
             <a:fld id="{D128741C-C433-404C-A096-8144BE32B6BD}" type="datetimeFigureOut">
               <a:rPr lang="ko-KR" altLang="en-US" smtClean="0"/>
-              <a:t>2018-02-16</a:t>
+              <a:t>2018-02-17</a:t>
             </a:fld>
             <a:endParaRPr lang="ko-KR" altLang="en-US"/>
           </a:p>
@@ -2401,7 +2402,7 @@
           <a:p>
             <a:fld id="{D128741C-C433-404C-A096-8144BE32B6BD}" type="datetimeFigureOut">
               <a:rPr lang="ko-KR" altLang="en-US" smtClean="0"/>
-              <a:t>2018-02-16</a:t>
+              <a:t>2018-02-17</a:t>
             </a:fld>
             <a:endParaRPr lang="ko-KR" altLang="en-US"/>
           </a:p>
@@ -2689,7 +2690,7 @@
           <a:p>
             <a:fld id="{D128741C-C433-404C-A096-8144BE32B6BD}" type="datetimeFigureOut">
               <a:rPr lang="ko-KR" altLang="en-US" smtClean="0"/>
-              <a:t>2018-02-16</a:t>
+              <a:t>2018-02-17</a:t>
             </a:fld>
             <a:endParaRPr lang="ko-KR" altLang="en-US"/>
           </a:p>
@@ -2930,7 +2931,7 @@
           <a:p>
             <a:fld id="{D128741C-C433-404C-A096-8144BE32B6BD}" type="datetimeFigureOut">
               <a:rPr lang="ko-KR" altLang="en-US" smtClean="0"/>
-              <a:t>2018-02-16</a:t>
+              <a:t>2018-02-17</a:t>
             </a:fld>
             <a:endParaRPr lang="ko-KR" altLang="en-US"/>
           </a:p>
@@ -4971,6 +4972,116 @@
     <p:extLst>
       <p:ext uri="{BB962C8B-B14F-4D97-AF65-F5344CB8AC3E}">
         <p14:creationId xmlns:p14="http://schemas.microsoft.com/office/powerpoint/2010/main" val="3588738504"/>
+      </p:ext>
+    </p:extLst>
+  </p:cSld>
+  <p:clrMapOvr>
+    <a:masterClrMapping/>
+  </p:clrMapOvr>
+</p:sld>
+</file>
+
+<file path=ppt/slides/slide23.xml><?xml version="1.0" encoding="utf-8"?>
+<p:sld xmlns:a="http://schemas.openxmlformats.org/drawingml/2006/main" xmlns:r="http://schemas.openxmlformats.org/officeDocument/2006/relationships" xmlns:p="http://schemas.openxmlformats.org/presentationml/2006/main">
+  <p:cSld>
+    <p:spTree>
+      <p:nvGrpSpPr>
+        <p:cNvPr id="1" name=""/>
+        <p:cNvGrpSpPr/>
+        <p:nvPr/>
+      </p:nvGrpSpPr>
+      <p:grpSpPr>
+        <a:xfrm>
+          <a:off x="0" y="0"/>
+          <a:ext cx="0" cy="0"/>
+          <a:chOff x="0" y="0"/>
+          <a:chExt cx="0" cy="0"/>
+        </a:xfrm>
+      </p:grpSpPr>
+      <p:sp>
+        <p:nvSpPr>
+          <p:cNvPr id="2" name="제목 1">
+            <a:extLst>
+              <a:ext uri="{FF2B5EF4-FFF2-40B4-BE49-F238E27FC236}">
+                <a16:creationId xmlns:a16="http://schemas.microsoft.com/office/drawing/2014/main" id="{B43683BF-7EE5-48FE-88BE-F94981F1E646}"/>
+              </a:ext>
+            </a:extLst>
+          </p:cNvPr>
+          <p:cNvSpPr>
+            <a:spLocks noGrp="1"/>
+          </p:cNvSpPr>
+          <p:nvPr>
+            <p:ph type="title"/>
+          </p:nvPr>
+        </p:nvSpPr>
+        <p:spPr/>
+        <p:txBody>
+          <a:bodyPr/>
+          <a:lstStyle/>
+          <a:p>
+            <a:endParaRPr lang="ko-KR" altLang="en-US"/>
+          </a:p>
+        </p:txBody>
+      </p:sp>
+      <p:sp>
+        <p:nvSpPr>
+          <p:cNvPr id="3" name="내용 개체 틀 2">
+            <a:extLst>
+              <a:ext uri="{FF2B5EF4-FFF2-40B4-BE49-F238E27FC236}">
+                <a16:creationId xmlns:a16="http://schemas.microsoft.com/office/drawing/2014/main" id="{913AED99-9780-4F76-9135-A8683FA84E2B}"/>
+              </a:ext>
+            </a:extLst>
+          </p:cNvPr>
+          <p:cNvSpPr>
+            <a:spLocks noGrp="1"/>
+          </p:cNvSpPr>
+          <p:nvPr>
+            <p:ph idx="1"/>
+          </p:nvPr>
+        </p:nvSpPr>
+        <p:spPr/>
+        <p:txBody>
+          <a:bodyPr/>
+          <a:lstStyle/>
+          <a:p>
+            <a:endParaRPr lang="ko-KR" altLang="en-US"/>
+          </a:p>
+        </p:txBody>
+      </p:sp>
+      <p:pic>
+        <p:nvPicPr>
+          <p:cNvPr id="4" name="그림 3">
+            <a:extLst>
+              <a:ext uri="{FF2B5EF4-FFF2-40B4-BE49-F238E27FC236}">
+                <a16:creationId xmlns:a16="http://schemas.microsoft.com/office/drawing/2014/main" id="{312941D5-31A7-4661-8196-BF0B9997E2EA}"/>
+              </a:ext>
+            </a:extLst>
+          </p:cNvPr>
+          <p:cNvPicPr>
+            <a:picLocks noChangeAspect="1"/>
+          </p:cNvPicPr>
+          <p:nvPr/>
+        </p:nvPicPr>
+        <p:blipFill>
+          <a:blip r:embed="rId2"/>
+          <a:stretch>
+            <a:fillRect/>
+          </a:stretch>
+        </p:blipFill>
+        <p:spPr>
+          <a:xfrm>
+            <a:off x="0" y="0"/>
+            <a:ext cx="12192000" cy="6858000"/>
+          </a:xfrm>
+          <a:prstGeom prst="rect">
+            <a:avLst/>
+          </a:prstGeom>
+        </p:spPr>
+      </p:pic>
+    </p:spTree>
+    <p:extLst>
+      <p:ext uri="{BB962C8B-B14F-4D97-AF65-F5344CB8AC3E}">
+        <p14:creationId xmlns:p14="http://schemas.microsoft.com/office/powerpoint/2010/main" val="3828769229"/>
       </p:ext>
     </p:extLst>
   </p:cSld>

</xml_diff>